<commit_message>
Correction code à l'aide de flake8 ajout requirement.txt pour flake8
</commit_message>
<xml_diff>
--- a/AlgoInvest&Trade.pptx
+++ b/AlgoInvest&Trade.pptx
@@ -120,6 +120,11 @@
       </a:defRPr>
     </a:lvl9pPr>
   </p:defaultTextStyle>
+  <p:extLst>
+    <p:ext uri="{EFAFB233-063F-42B5-8137-9DF3F51BA10A}">
+      <p15:sldGuideLst xmlns:p15="http://schemas.microsoft.com/office/powerpoint/2012/main"/>
+    </p:ext>
+  </p:extLst>
 </p:presentation>
 </file>
 
@@ -205,7 +210,7 @@
           <a:p>
             <a:fld id="{BCB9BB37-B89F-4B06-BD1C-05CA20379372}" type="datetimeFigureOut">
               <a:rPr lang="fr-FR" smtClean="0"/>
-              <a:t>05/09/2021</a:t>
+              <a:t>06/09/2021</a:t>
             </a:fld>
             <a:endParaRPr lang="fr-FR" dirty="0"/>
           </a:p>
@@ -1764,7 +1769,7 @@
           <a:p>
             <a:fld id="{982A5430-F9BB-4E1D-BCD0-73DF89425F04}" type="datetimeFigureOut">
               <a:rPr lang="fr-FR" smtClean="0"/>
-              <a:t>05/09/2021</a:t>
+              <a:t>06/09/2021</a:t>
             </a:fld>
             <a:endParaRPr lang="fr-FR" dirty="0"/>
           </a:p>
@@ -1934,7 +1939,7 @@
           <a:p>
             <a:fld id="{982A5430-F9BB-4E1D-BCD0-73DF89425F04}" type="datetimeFigureOut">
               <a:rPr lang="fr-FR" smtClean="0"/>
-              <a:t>05/09/2021</a:t>
+              <a:t>06/09/2021</a:t>
             </a:fld>
             <a:endParaRPr lang="fr-FR" dirty="0"/>
           </a:p>
@@ -2114,7 +2119,7 @@
           <a:p>
             <a:fld id="{982A5430-F9BB-4E1D-BCD0-73DF89425F04}" type="datetimeFigureOut">
               <a:rPr lang="fr-FR" smtClean="0"/>
-              <a:t>05/09/2021</a:t>
+              <a:t>06/09/2021</a:t>
             </a:fld>
             <a:endParaRPr lang="fr-FR" dirty="0"/>
           </a:p>
@@ -2284,7 +2289,7 @@
           <a:p>
             <a:fld id="{982A5430-F9BB-4E1D-BCD0-73DF89425F04}" type="datetimeFigureOut">
               <a:rPr lang="fr-FR" smtClean="0"/>
-              <a:t>05/09/2021</a:t>
+              <a:t>06/09/2021</a:t>
             </a:fld>
             <a:endParaRPr lang="fr-FR" dirty="0"/>
           </a:p>
@@ -2530,7 +2535,7 @@
           <a:p>
             <a:fld id="{982A5430-F9BB-4E1D-BCD0-73DF89425F04}" type="datetimeFigureOut">
               <a:rPr lang="fr-FR" smtClean="0"/>
-              <a:t>05/09/2021</a:t>
+              <a:t>06/09/2021</a:t>
             </a:fld>
             <a:endParaRPr lang="fr-FR" dirty="0"/>
           </a:p>
@@ -2762,7 +2767,7 @@
           <a:p>
             <a:fld id="{982A5430-F9BB-4E1D-BCD0-73DF89425F04}" type="datetimeFigureOut">
               <a:rPr lang="fr-FR" smtClean="0"/>
-              <a:t>05/09/2021</a:t>
+              <a:t>06/09/2021</a:t>
             </a:fld>
             <a:endParaRPr lang="fr-FR" dirty="0"/>
           </a:p>
@@ -3129,7 +3134,7 @@
           <a:p>
             <a:fld id="{982A5430-F9BB-4E1D-BCD0-73DF89425F04}" type="datetimeFigureOut">
               <a:rPr lang="fr-FR" smtClean="0"/>
-              <a:t>05/09/2021</a:t>
+              <a:t>06/09/2021</a:t>
             </a:fld>
             <a:endParaRPr lang="fr-FR" dirty="0"/>
           </a:p>
@@ -3247,7 +3252,7 @@
           <a:p>
             <a:fld id="{982A5430-F9BB-4E1D-BCD0-73DF89425F04}" type="datetimeFigureOut">
               <a:rPr lang="fr-FR" smtClean="0"/>
-              <a:t>05/09/2021</a:t>
+              <a:t>06/09/2021</a:t>
             </a:fld>
             <a:endParaRPr lang="fr-FR" dirty="0"/>
           </a:p>
@@ -3342,7 +3347,7 @@
           <a:p>
             <a:fld id="{982A5430-F9BB-4E1D-BCD0-73DF89425F04}" type="datetimeFigureOut">
               <a:rPr lang="fr-FR" smtClean="0"/>
-              <a:t>05/09/2021</a:t>
+              <a:t>06/09/2021</a:t>
             </a:fld>
             <a:endParaRPr lang="fr-FR" dirty="0"/>
           </a:p>
@@ -3619,7 +3624,7 @@
           <a:p>
             <a:fld id="{982A5430-F9BB-4E1D-BCD0-73DF89425F04}" type="datetimeFigureOut">
               <a:rPr lang="fr-FR" smtClean="0"/>
-              <a:t>05/09/2021</a:t>
+              <a:t>06/09/2021</a:t>
             </a:fld>
             <a:endParaRPr lang="fr-FR" dirty="0"/>
           </a:p>
@@ -3872,7 +3877,7 @@
           <a:p>
             <a:fld id="{982A5430-F9BB-4E1D-BCD0-73DF89425F04}" type="datetimeFigureOut">
               <a:rPr lang="fr-FR" smtClean="0"/>
-              <a:t>05/09/2021</a:t>
+              <a:t>06/09/2021</a:t>
             </a:fld>
             <a:endParaRPr lang="fr-FR" dirty="0"/>
           </a:p>
@@ -4115,7 +4120,7 @@
           <a:p>
             <a:fld id="{982A5430-F9BB-4E1D-BCD0-73DF89425F04}" type="datetimeFigureOut">
               <a:rPr lang="fr-FR" smtClean="0"/>
-              <a:t>05/09/2021</a:t>
+              <a:t>06/09/2021</a:t>
             </a:fld>
             <a:endParaRPr lang="fr-FR" dirty="0"/>
           </a:p>
@@ -4926,7 +4931,7 @@
                             </p:stCondLst>
                             <p:childTnLst>
                               <p:par>
-                                <p:cTn id="5" presetID="10" presetClass="entr" presetSubtype="0" fill="hold" grpId="0" nodeType="clickEffect">
+                                <p:cTn id="5" presetID="1" presetClass="entr" presetSubtype="0" fill="hold" grpId="0" nodeType="clickEffect">
                                   <p:stCondLst>
                                     <p:cond delay="0"/>
                                   </p:stCondLst>
@@ -4940,9 +4945,7 @@
                                         </p:cTn>
                                         <p:tgtEl>
                                           <p:spTgt spid="3">
-                                            <p:txEl>
-                                              <p:pRg st="0" end="0"/>
-                                            </p:txEl>
+                                            <p:bg/>
                                           </p:spTgt>
                                         </p:tgtEl>
                                         <p:attrNameLst>
@@ -4953,39 +4956,25 @@
                                         <p:strVal val="visible"/>
                                       </p:to>
                                     </p:set>
-                                    <p:animEffect transition="in" filter="fade">
-                                      <p:cBhvr>
-                                        <p:cTn id="7" dur="500"/>
-                                        <p:tgtEl>
-                                          <p:spTgt spid="3">
-                                            <p:txEl>
-                                              <p:pRg st="0" end="0"/>
-                                            </p:txEl>
-                                          </p:spTgt>
-                                        </p:tgtEl>
-                                      </p:cBhvr>
-                                    </p:animEffect>
                                   </p:childTnLst>
                                 </p:cTn>
                               </p:par>
                               <p:par>
-                                <p:cTn id="8" presetID="10" presetClass="entr" presetSubtype="0" fill="hold" grpId="0" nodeType="withEffect">
+                                <p:cTn id="7" presetID="1" presetClass="entr" presetSubtype="0" fill="hold" grpId="0" nodeType="withEffect">
                                   <p:stCondLst>
                                     <p:cond delay="0"/>
                                   </p:stCondLst>
                                   <p:childTnLst>
                                     <p:set>
                                       <p:cBhvr>
-                                        <p:cTn id="9" dur="1" fill="hold">
+                                        <p:cTn id="8" dur="1" fill="hold">
                                           <p:stCondLst>
                                             <p:cond delay="0"/>
                                           </p:stCondLst>
                                         </p:cTn>
                                         <p:tgtEl>
                                           <p:spTgt spid="4">
-                                            <p:txEl>
-                                              <p:pRg st="0" end="0"/>
-                                            </p:txEl>
+                                            <p:bg/>
                                           </p:spTgt>
                                         </p:tgtEl>
                                         <p:attrNameLst>
@@ -4996,9 +4985,53 @@
                                         <p:strVal val="visible"/>
                                       </p:to>
                                     </p:set>
-                                    <p:animEffect transition="in" filter="fade">
-                                      <p:cBhvr>
-                                        <p:cTn id="10" dur="500"/>
+                                  </p:childTnLst>
+                                </p:cTn>
+                              </p:par>
+                              <p:par>
+                                <p:cTn id="9" presetID="1" presetClass="entr" presetSubtype="0" fill="hold" grpId="0" nodeType="withEffect">
+                                  <p:stCondLst>
+                                    <p:cond delay="0"/>
+                                  </p:stCondLst>
+                                  <p:childTnLst>
+                                    <p:set>
+                                      <p:cBhvr>
+                                        <p:cTn id="10" dur="1" fill="hold">
+                                          <p:stCondLst>
+                                            <p:cond delay="0"/>
+                                          </p:stCondLst>
+                                        </p:cTn>
+                                        <p:tgtEl>
+                                          <p:spTgt spid="3">
+                                            <p:txEl>
+                                              <p:pRg st="0" end="0"/>
+                                            </p:txEl>
+                                          </p:spTgt>
+                                        </p:tgtEl>
+                                        <p:attrNameLst>
+                                          <p:attrName>style.visibility</p:attrName>
+                                        </p:attrNameLst>
+                                      </p:cBhvr>
+                                      <p:to>
+                                        <p:strVal val="visible"/>
+                                      </p:to>
+                                    </p:set>
+                                  </p:childTnLst>
+                                </p:cTn>
+                              </p:par>
+                              <p:par>
+                                <p:cTn id="11" presetID="1" presetClass="entr" presetSubtype="0" fill="hold" grpId="0" nodeType="withEffect">
+                                  <p:stCondLst>
+                                    <p:cond delay="0"/>
+                                  </p:stCondLst>
+                                  <p:childTnLst>
+                                    <p:set>
+                                      <p:cBhvr>
+                                        <p:cTn id="12" dur="1" fill="hold">
+                                          <p:stCondLst>
+                                            <p:cond delay="0"/>
+                                          </p:stCondLst>
+                                        </p:cTn>
                                         <p:tgtEl>
                                           <p:spTgt spid="4">
                                             <p:txEl>
@@ -5006,8 +5039,14 @@
                                             </p:txEl>
                                           </p:spTgt>
                                         </p:tgtEl>
-                                      </p:cBhvr>
-                                    </p:animEffect>
+                                        <p:attrNameLst>
+                                          <p:attrName>style.visibility</p:attrName>
+                                        </p:attrNameLst>
+                                      </p:cBhvr>
+                                      <p:to>
+                                        <p:strVal val="visible"/>
+                                      </p:to>
+                                    </p:set>
                                   </p:childTnLst>
                                 </p:cTn>
                               </p:par>
@@ -5018,26 +5057,26 @@
                     </p:cTn>
                   </p:par>
                   <p:par>
-                    <p:cTn id="11" fill="hold">
+                    <p:cTn id="13" fill="hold">
                       <p:stCondLst>
                         <p:cond delay="indefinite"/>
                       </p:stCondLst>
                       <p:childTnLst>
                         <p:par>
-                          <p:cTn id="12" fill="hold">
+                          <p:cTn id="14" fill="hold">
                             <p:stCondLst>
                               <p:cond delay="0"/>
                             </p:stCondLst>
                             <p:childTnLst>
                               <p:par>
-                                <p:cTn id="13" presetID="10" presetClass="entr" presetSubtype="0" fill="hold" grpId="0" nodeType="clickEffect">
+                                <p:cTn id="15" presetID="1" presetClass="entr" presetSubtype="0" fill="hold" grpId="0" nodeType="clickEffect">
                                   <p:stCondLst>
                                     <p:cond delay="0"/>
                                   </p:stCondLst>
                                   <p:childTnLst>
                                     <p:set>
                                       <p:cBhvr>
-                                        <p:cTn id="14" dur="1" fill="hold">
+                                        <p:cTn id="16" dur="1" fill="hold">
                                           <p:stCondLst>
                                             <p:cond delay="0"/>
                                           </p:stCondLst>
@@ -5057,30 +5096,18 @@
                                         <p:strVal val="visible"/>
                                       </p:to>
                                     </p:set>
-                                    <p:animEffect transition="in" filter="fade">
-                                      <p:cBhvr>
-                                        <p:cTn id="15" dur="500"/>
-                                        <p:tgtEl>
-                                          <p:spTgt spid="3">
-                                            <p:txEl>
-                                              <p:pRg st="1" end="1"/>
-                                            </p:txEl>
-                                          </p:spTgt>
-                                        </p:tgtEl>
-                                      </p:cBhvr>
-                                    </p:animEffect>
                                   </p:childTnLst>
                                 </p:cTn>
                               </p:par>
                               <p:par>
-                                <p:cTn id="16" presetID="10" presetClass="entr" presetSubtype="0" fill="hold" grpId="0" nodeType="withEffect">
+                                <p:cTn id="17" presetID="1" presetClass="entr" presetSubtype="0" fill="hold" grpId="0" nodeType="withEffect">
                                   <p:stCondLst>
                                     <p:cond delay="0"/>
                                   </p:stCondLst>
                                   <p:childTnLst>
                                     <p:set>
                                       <p:cBhvr>
-                                        <p:cTn id="17" dur="1" fill="hold">
+                                        <p:cTn id="18" dur="1" fill="hold">
                                           <p:stCondLst>
                                             <p:cond delay="0"/>
                                           </p:stCondLst>
@@ -5100,18 +5127,6 @@
                                         <p:strVal val="visible"/>
                                       </p:to>
                                     </p:set>
-                                    <p:animEffect transition="in" filter="fade">
-                                      <p:cBhvr>
-                                        <p:cTn id="18" dur="500"/>
-                                        <p:tgtEl>
-                                          <p:spTgt spid="4">
-                                            <p:txEl>
-                                              <p:pRg st="1" end="1"/>
-                                            </p:txEl>
-                                          </p:spTgt>
-                                        </p:tgtEl>
-                                      </p:cBhvr>
-                                    </p:animEffect>
                                   </p:childTnLst>
                                 </p:cTn>
                               </p:par>
@@ -5134,7 +5149,7 @@
                             </p:stCondLst>
                             <p:childTnLst>
                               <p:par>
-                                <p:cTn id="21" presetID="10" presetClass="entr" presetSubtype="0" fill="hold" grpId="0" nodeType="clickEffect">
+                                <p:cTn id="21" presetID="1" presetClass="entr" presetSubtype="0" fill="hold" grpId="0" nodeType="clickEffect">
                                   <p:stCondLst>
                                     <p:cond delay="0"/>
                                   </p:stCondLst>
@@ -5161,30 +5176,18 @@
                                         <p:strVal val="visible"/>
                                       </p:to>
                                     </p:set>
-                                    <p:animEffect transition="in" filter="fade">
-                                      <p:cBhvr>
-                                        <p:cTn id="23" dur="500"/>
-                                        <p:tgtEl>
-                                          <p:spTgt spid="3">
-                                            <p:txEl>
-                                              <p:pRg st="2" end="2"/>
-                                            </p:txEl>
-                                          </p:spTgt>
-                                        </p:tgtEl>
-                                      </p:cBhvr>
-                                    </p:animEffect>
                                   </p:childTnLst>
                                 </p:cTn>
                               </p:par>
                               <p:par>
-                                <p:cTn id="24" presetID="10" presetClass="entr" presetSubtype="0" fill="hold" grpId="0" nodeType="withEffect">
+                                <p:cTn id="23" presetID="1" presetClass="entr" presetSubtype="0" fill="hold" grpId="0" nodeType="withEffect">
                                   <p:stCondLst>
                                     <p:cond delay="0"/>
                                   </p:stCondLst>
                                   <p:childTnLst>
                                     <p:set>
                                       <p:cBhvr>
-                                        <p:cTn id="25" dur="1" fill="hold">
+                                        <p:cTn id="24" dur="1" fill="hold">
                                           <p:stCondLst>
                                             <p:cond delay="0"/>
                                           </p:stCondLst>
@@ -5204,18 +5207,6 @@
                                         <p:strVal val="visible"/>
                                       </p:to>
                                     </p:set>
-                                    <p:animEffect transition="in" filter="fade">
-                                      <p:cBhvr>
-                                        <p:cTn id="26" dur="500"/>
-                                        <p:tgtEl>
-                                          <p:spTgt spid="4">
-                                            <p:txEl>
-                                              <p:pRg st="2" end="2"/>
-                                            </p:txEl>
-                                          </p:spTgt>
-                                        </p:tgtEl>
-                                      </p:cBhvr>
-                                    </p:animEffect>
                                   </p:childTnLst>
                                 </p:cTn>
                               </p:par>
@@ -5226,32 +5217,63 @@
                     </p:cTn>
                   </p:par>
                   <p:par>
-                    <p:cTn id="27" fill="hold">
+                    <p:cTn id="25" fill="hold">
                       <p:stCondLst>
                         <p:cond delay="indefinite"/>
                       </p:stCondLst>
                       <p:childTnLst>
                         <p:par>
-                          <p:cTn id="28" fill="hold">
+                          <p:cTn id="26" fill="hold">
                             <p:stCondLst>
                               <p:cond delay="0"/>
                             </p:stCondLst>
                             <p:childTnLst>
                               <p:par>
-                                <p:cTn id="29" presetID="10" presetClass="entr" presetSubtype="0" fill="hold" grpId="0" nodeType="clickEffect">
+                                <p:cTn id="27" presetID="1" presetClass="entr" presetSubtype="0" fill="hold" grpId="0" nodeType="clickEffect">
                                   <p:stCondLst>
                                     <p:cond delay="0"/>
                                   </p:stCondLst>
                                   <p:childTnLst>
                                     <p:set>
                                       <p:cBhvr>
+                                        <p:cTn id="28" dur="1" fill="hold">
+                                          <p:stCondLst>
+                                            <p:cond delay="0"/>
+                                          </p:stCondLst>
+                                        </p:cTn>
+                                        <p:tgtEl>
+                                          <p:spTgt spid="3">
+                                            <p:txEl>
+                                              <p:pRg st="3" end="3"/>
+                                            </p:txEl>
+                                          </p:spTgt>
+                                        </p:tgtEl>
+                                        <p:attrNameLst>
+                                          <p:attrName>style.visibility</p:attrName>
+                                        </p:attrNameLst>
+                                      </p:cBhvr>
+                                      <p:to>
+                                        <p:strVal val="visible"/>
+                                      </p:to>
+                                    </p:set>
+                                  </p:childTnLst>
+                                </p:cTn>
+                              </p:par>
+                              <p:par>
+                                <p:cTn id="29" presetID="1" presetClass="entr" presetSubtype="0" fill="hold" grpId="0" nodeType="withEffect">
+                                  <p:stCondLst>
+                                    <p:cond delay="0"/>
+                                  </p:stCondLst>
+                                  <p:childTnLst>
+                                    <p:set>
+                                      <p:cBhvr>
                                         <p:cTn id="30" dur="1" fill="hold">
                                           <p:stCondLst>
                                             <p:cond delay="0"/>
                                           </p:stCondLst>
                                         </p:cTn>
                                         <p:tgtEl>
-                                          <p:spTgt spid="3">
+                                          <p:spTgt spid="4">
                                             <p:txEl>
                                               <p:pRg st="3" end="3"/>
                                             </p:txEl>
@@ -5265,61 +5287,6 @@
                                         <p:strVal val="visible"/>
                                       </p:to>
                                     </p:set>
-                                    <p:animEffect transition="in" filter="fade">
-                                      <p:cBhvr>
-                                        <p:cTn id="31" dur="500"/>
-                                        <p:tgtEl>
-                                          <p:spTgt spid="3">
-                                            <p:txEl>
-                                              <p:pRg st="3" end="3"/>
-                                            </p:txEl>
-                                          </p:spTgt>
-                                        </p:tgtEl>
-                                      </p:cBhvr>
-                                    </p:animEffect>
-                                  </p:childTnLst>
-                                </p:cTn>
-                              </p:par>
-                              <p:par>
-                                <p:cTn id="32" presetID="10" presetClass="entr" presetSubtype="0" fill="hold" grpId="0" nodeType="withEffect">
-                                  <p:stCondLst>
-                                    <p:cond delay="0"/>
-                                  </p:stCondLst>
-                                  <p:childTnLst>
-                                    <p:set>
-                                      <p:cBhvr>
-                                        <p:cTn id="33" dur="1" fill="hold">
-                                          <p:stCondLst>
-                                            <p:cond delay="0"/>
-                                          </p:stCondLst>
-                                        </p:cTn>
-                                        <p:tgtEl>
-                                          <p:spTgt spid="4">
-                                            <p:txEl>
-                                              <p:pRg st="3" end="3"/>
-                                            </p:txEl>
-                                          </p:spTgt>
-                                        </p:tgtEl>
-                                        <p:attrNameLst>
-                                          <p:attrName>style.visibility</p:attrName>
-                                        </p:attrNameLst>
-                                      </p:cBhvr>
-                                      <p:to>
-                                        <p:strVal val="visible"/>
-                                      </p:to>
-                                    </p:set>
-                                    <p:animEffect transition="in" filter="fade">
-                                      <p:cBhvr>
-                                        <p:cTn id="34" dur="500"/>
-                                        <p:tgtEl>
-                                          <p:spTgt spid="4">
-                                            <p:txEl>
-                                              <p:pRg st="3" end="3"/>
-                                            </p:txEl>
-                                          </p:spTgt>
-                                        </p:tgtEl>
-                                      </p:cBhvr>
-                                    </p:animEffect>
                                   </p:childTnLst>
                                 </p:cTn>
                               </p:par>
@@ -5330,26 +5297,26 @@
                     </p:cTn>
                   </p:par>
                   <p:par>
-                    <p:cTn id="35" fill="hold">
+                    <p:cTn id="31" fill="hold">
                       <p:stCondLst>
                         <p:cond delay="indefinite"/>
                       </p:stCondLst>
                       <p:childTnLst>
                         <p:par>
-                          <p:cTn id="36" fill="hold">
+                          <p:cTn id="32" fill="hold">
                             <p:stCondLst>
                               <p:cond delay="0"/>
                             </p:stCondLst>
                             <p:childTnLst>
                               <p:par>
-                                <p:cTn id="37" presetID="10" presetClass="entr" presetSubtype="0" fill="hold" grpId="0" nodeType="clickEffect">
+                                <p:cTn id="33" presetID="1" presetClass="entr" presetSubtype="0" fill="hold" grpId="0" nodeType="clickEffect">
                                   <p:stCondLst>
                                     <p:cond delay="0"/>
                                   </p:stCondLst>
                                   <p:childTnLst>
                                     <p:set>
                                       <p:cBhvr>
-                                        <p:cTn id="38" dur="1" fill="hold">
+                                        <p:cTn id="34" dur="1" fill="hold">
                                           <p:stCondLst>
                                             <p:cond delay="0"/>
                                           </p:stCondLst>
@@ -5369,30 +5336,18 @@
                                         <p:strVal val="visible"/>
                                       </p:to>
                                     </p:set>
-                                    <p:animEffect transition="in" filter="fade">
-                                      <p:cBhvr>
-                                        <p:cTn id="39" dur="500"/>
-                                        <p:tgtEl>
-                                          <p:spTgt spid="3">
-                                            <p:txEl>
-                                              <p:pRg st="5" end="5"/>
-                                            </p:txEl>
-                                          </p:spTgt>
-                                        </p:tgtEl>
-                                      </p:cBhvr>
-                                    </p:animEffect>
                                   </p:childTnLst>
                                 </p:cTn>
                               </p:par>
                               <p:par>
-                                <p:cTn id="40" presetID="10" presetClass="entr" presetSubtype="0" fill="hold" grpId="0" nodeType="withEffect">
+                                <p:cTn id="35" presetID="1" presetClass="entr" presetSubtype="0" fill="hold" grpId="0" nodeType="withEffect">
                                   <p:stCondLst>
                                     <p:cond delay="0"/>
                                   </p:stCondLst>
                                   <p:childTnLst>
                                     <p:set>
                                       <p:cBhvr>
-                                        <p:cTn id="41" dur="1" fill="hold">
+                                        <p:cTn id="36" dur="1" fill="hold">
                                           <p:stCondLst>
                                             <p:cond delay="0"/>
                                           </p:stCondLst>
@@ -5412,18 +5367,6 @@
                                         <p:strVal val="visible"/>
                                       </p:to>
                                     </p:set>
-                                    <p:animEffect transition="in" filter="fade">
-                                      <p:cBhvr>
-                                        <p:cTn id="42" dur="500"/>
-                                        <p:tgtEl>
-                                          <p:spTgt spid="4">
-                                            <p:txEl>
-                                              <p:pRg st="4" end="4"/>
-                                            </p:txEl>
-                                          </p:spTgt>
-                                        </p:tgtEl>
-                                      </p:cBhvr>
-                                    </p:animEffect>
                                   </p:childTnLst>
                                 </p:cTn>
                               </p:par>
@@ -5434,26 +5377,26 @@
                     </p:cTn>
                   </p:par>
                   <p:par>
-                    <p:cTn id="43" fill="hold">
+                    <p:cTn id="37" fill="hold">
                       <p:stCondLst>
                         <p:cond delay="indefinite"/>
                       </p:stCondLst>
                       <p:childTnLst>
                         <p:par>
-                          <p:cTn id="44" fill="hold">
+                          <p:cTn id="38" fill="hold">
                             <p:stCondLst>
                               <p:cond delay="0"/>
                             </p:stCondLst>
                             <p:childTnLst>
                               <p:par>
-                                <p:cTn id="45" presetID="10" presetClass="entr" presetSubtype="0" fill="hold" grpId="0" nodeType="clickEffect">
+                                <p:cTn id="39" presetID="1" presetClass="entr" presetSubtype="0" fill="hold" grpId="0" nodeType="clickEffect">
                                   <p:stCondLst>
                                     <p:cond delay="0"/>
                                   </p:stCondLst>
                                   <p:childTnLst>
                                     <p:set>
                                       <p:cBhvr>
-                                        <p:cTn id="46" dur="1" fill="hold">
+                                        <p:cTn id="40" dur="1" fill="hold">
                                           <p:stCondLst>
                                             <p:cond delay="0"/>
                                           </p:stCondLst>
@@ -5473,30 +5416,18 @@
                                         <p:strVal val="visible"/>
                                       </p:to>
                                     </p:set>
-                                    <p:animEffect transition="in" filter="fade">
-                                      <p:cBhvr>
-                                        <p:cTn id="47" dur="500"/>
-                                        <p:tgtEl>
-                                          <p:spTgt spid="3">
-                                            <p:txEl>
-                                              <p:pRg st="7" end="7"/>
-                                            </p:txEl>
-                                          </p:spTgt>
-                                        </p:tgtEl>
-                                      </p:cBhvr>
-                                    </p:animEffect>
                                   </p:childTnLst>
                                 </p:cTn>
                               </p:par>
                               <p:par>
-                                <p:cTn id="48" presetID="10" presetClass="entr" presetSubtype="0" fill="hold" grpId="0" nodeType="withEffect">
+                                <p:cTn id="41" presetID="1" presetClass="entr" presetSubtype="0" fill="hold" grpId="0" nodeType="withEffect">
                                   <p:stCondLst>
                                     <p:cond delay="0"/>
                                   </p:stCondLst>
                                   <p:childTnLst>
                                     <p:set>
                                       <p:cBhvr>
-                                        <p:cTn id="49" dur="1" fill="hold">
+                                        <p:cTn id="42" dur="1" fill="hold">
                                           <p:stCondLst>
                                             <p:cond delay="0"/>
                                           </p:stCondLst>
@@ -5516,18 +5447,6 @@
                                         <p:strVal val="visible"/>
                                       </p:to>
                                     </p:set>
-                                    <p:animEffect transition="in" filter="fade">
-                                      <p:cBhvr>
-                                        <p:cTn id="50" dur="500"/>
-                                        <p:tgtEl>
-                                          <p:spTgt spid="4">
-                                            <p:txEl>
-                                              <p:pRg st="5" end="5"/>
-                                            </p:txEl>
-                                          </p:spTgt>
-                                        </p:tgtEl>
-                                      </p:cBhvr>
-                                    </p:animEffect>
                                   </p:childTnLst>
                                 </p:cTn>
                               </p:par>
@@ -5559,8 +5478,8 @@
       </p:par>
     </p:tnLst>
     <p:bldLst>
-      <p:bldP spid="3" grpId="0" uiExpand="1" build="p"/>
-      <p:bldP spid="4" grpId="0" uiExpand="1" build="p"/>
+      <p:bldP spid="3" grpId="0" uiExpand="1" build="p" animBg="1"/>
+      <p:bldP spid="4" grpId="0" uiExpand="1" build="p" animBg="1"/>
     </p:bldLst>
   </p:timing>
 </p:sld>
@@ -5852,7 +5771,6 @@
               <a:rPr lang="fr-FR" dirty="0" smtClean="0"/>
               <a:t>Best choice to invest :</a:t>
             </a:r>
-            <a:endParaRPr lang="fr-FR" dirty="0" smtClean="0"/>
           </a:p>
           <a:p>
             <a:pPr marL="0" indent="0">
@@ -12075,7 +11993,15 @@
             </a:r>
             <a:r>
               <a:rPr lang="fr-FR" dirty="0" smtClean="0"/>
-              <a:t>aura 2n </a:t>
+              <a:t>aura 2</a:t>
+            </a:r>
+            <a:r>
+              <a:rPr lang="fr-FR" baseline="30000" dirty="0" smtClean="0"/>
+              <a:t>n</a:t>
+            </a:r>
+            <a:r>
+              <a:rPr lang="fr-FR" dirty="0" smtClean="0"/>
+              <a:t> </a:t>
             </a:r>
             <a:r>
               <a:rPr lang="fr-FR" dirty="0"/>
@@ -12274,10 +12200,6 @@
               <a:rPr lang="fr-FR" dirty="0" smtClean="0"/>
               <a:t>Algorithme de force brute</a:t>
             </a:r>
-            <a:r>
-              <a:rPr lang="fr-FR" dirty="0" smtClean="0"/>
-              <a:t/>
-            </a:r>
             <a:br>
               <a:rPr lang="fr-FR" dirty="0" smtClean="0"/>
             </a:br>
@@ -12508,10 +12430,6 @@
             <a:r>
               <a:rPr lang="fr-FR" dirty="0" smtClean="0"/>
               <a:t>Algorithme de force brute</a:t>
-            </a:r>
-            <a:r>
-              <a:rPr lang="fr-FR" dirty="0" smtClean="0"/>
-              <a:t/>
             </a:r>
             <a:br>
               <a:rPr lang="fr-FR" dirty="0" smtClean="0"/>
@@ -13093,7 +13011,7 @@
                             </p:stCondLst>
                             <p:childTnLst>
                               <p:par>
-                                <p:cTn id="10" presetID="10" presetClass="entr" presetSubtype="0" fill="hold" grpId="0" nodeType="clickEffect">
+                                <p:cTn id="10" presetID="1" presetClass="entr" presetSubtype="0" fill="hold" grpId="0" nodeType="clickEffect">
                                   <p:stCondLst>
                                     <p:cond delay="0"/>
                                   </p:stCondLst>
@@ -13107,9 +13025,7 @@
                                         </p:cTn>
                                         <p:tgtEl>
                                           <p:spTgt spid="4">
-                                            <p:txEl>
-                                              <p:pRg st="0" end="0"/>
-                                            </p:txEl>
+                                            <p:bg/>
                                           </p:spTgt>
                                         </p:tgtEl>
                                         <p:attrNameLst>
@@ -13120,9 +13036,22 @@
                                         <p:strVal val="visible"/>
                                       </p:to>
                                     </p:set>
-                                    <p:animEffect transition="in" filter="fade">
-                                      <p:cBhvr>
-                                        <p:cTn id="12" dur="500"/>
+                                  </p:childTnLst>
+                                </p:cTn>
+                              </p:par>
+                              <p:par>
+                                <p:cTn id="12" presetID="1" presetClass="entr" presetSubtype="0" fill="hold" grpId="0" nodeType="withEffect">
+                                  <p:stCondLst>
+                                    <p:cond delay="0"/>
+                                  </p:stCondLst>
+                                  <p:childTnLst>
+                                    <p:set>
+                                      <p:cBhvr>
+                                        <p:cTn id="13" dur="1" fill="hold">
+                                          <p:stCondLst>
+                                            <p:cond delay="0"/>
+                                          </p:stCondLst>
+                                        </p:cTn>
                                         <p:tgtEl>
                                           <p:spTgt spid="4">
                                             <p:txEl>
@@ -13130,8 +13059,14 @@
                                             </p:txEl>
                                           </p:spTgt>
                                         </p:tgtEl>
-                                      </p:cBhvr>
-                                    </p:animEffect>
+                                        <p:attrNameLst>
+                                          <p:attrName>style.visibility</p:attrName>
+                                        </p:attrNameLst>
+                                      </p:cBhvr>
+                                      <p:to>
+                                        <p:strVal val="visible"/>
+                                      </p:to>
+                                    </p:set>
                                   </p:childTnLst>
                                 </p:cTn>
                               </p:par>
@@ -13142,26 +13077,26 @@
                     </p:cTn>
                   </p:par>
                   <p:par>
-                    <p:cTn id="13" fill="hold">
+                    <p:cTn id="14" fill="hold">
                       <p:stCondLst>
                         <p:cond delay="indefinite"/>
                       </p:stCondLst>
                       <p:childTnLst>
                         <p:par>
-                          <p:cTn id="14" fill="hold">
+                          <p:cTn id="15" fill="hold">
                             <p:stCondLst>
                               <p:cond delay="0"/>
                             </p:stCondLst>
                             <p:childTnLst>
                               <p:par>
-                                <p:cTn id="15" presetID="10" presetClass="entr" presetSubtype="0" fill="hold" grpId="0" nodeType="clickEffect">
+                                <p:cTn id="16" presetID="1" presetClass="entr" presetSubtype="0" fill="hold" grpId="0" nodeType="clickEffect">
                                   <p:stCondLst>
                                     <p:cond delay="0"/>
                                   </p:stCondLst>
                                   <p:childTnLst>
                                     <p:set>
                                       <p:cBhvr>
-                                        <p:cTn id="16" dur="1" fill="hold">
+                                        <p:cTn id="17" dur="1" fill="hold">
                                           <p:stCondLst>
                                             <p:cond delay="0"/>
                                           </p:stCondLst>
@@ -13181,18 +13116,6 @@
                                         <p:strVal val="visible"/>
                                       </p:to>
                                     </p:set>
-                                    <p:animEffect transition="in" filter="fade">
-                                      <p:cBhvr>
-                                        <p:cTn id="17" dur="500"/>
-                                        <p:tgtEl>
-                                          <p:spTgt spid="4">
-                                            <p:txEl>
-                                              <p:pRg st="1" end="1"/>
-                                            </p:txEl>
-                                          </p:spTgt>
-                                        </p:tgtEl>
-                                      </p:cBhvr>
-                                    </p:animEffect>
                                   </p:childTnLst>
                                 </p:cTn>
                               </p:par>
@@ -13215,7 +13138,7 @@
                             </p:stCondLst>
                             <p:childTnLst>
                               <p:par>
-                                <p:cTn id="20" presetID="10" presetClass="entr" presetSubtype="0" fill="hold" grpId="0" nodeType="clickEffect">
+                                <p:cTn id="20" presetID="1" presetClass="entr" presetSubtype="0" fill="hold" grpId="0" nodeType="clickEffect">
                                   <p:stCondLst>
                                     <p:cond delay="0"/>
                                   </p:stCondLst>
@@ -13242,18 +13165,6 @@
                                         <p:strVal val="visible"/>
                                       </p:to>
                                     </p:set>
-                                    <p:animEffect transition="in" filter="fade">
-                                      <p:cBhvr>
-                                        <p:cTn id="22" dur="500"/>
-                                        <p:tgtEl>
-                                          <p:spTgt spid="4">
-                                            <p:txEl>
-                                              <p:pRg st="2" end="2"/>
-                                            </p:txEl>
-                                          </p:spTgt>
-                                        </p:tgtEl>
-                                      </p:cBhvr>
-                                    </p:animEffect>
                                   </p:childTnLst>
                                 </p:cTn>
                               </p:par>
@@ -13264,26 +13175,26 @@
                     </p:cTn>
                   </p:par>
                   <p:par>
-                    <p:cTn id="23" fill="hold">
+                    <p:cTn id="22" fill="hold">
                       <p:stCondLst>
                         <p:cond delay="indefinite"/>
                       </p:stCondLst>
                       <p:childTnLst>
                         <p:par>
-                          <p:cTn id="24" fill="hold">
+                          <p:cTn id="23" fill="hold">
                             <p:stCondLst>
                               <p:cond delay="0"/>
                             </p:stCondLst>
                             <p:childTnLst>
                               <p:par>
-                                <p:cTn id="25" presetID="10" presetClass="entr" presetSubtype="0" fill="hold" grpId="0" nodeType="clickEffect">
+                                <p:cTn id="24" presetID="1" presetClass="entr" presetSubtype="0" fill="hold" grpId="0" nodeType="clickEffect">
                                   <p:stCondLst>
                                     <p:cond delay="0"/>
                                   </p:stCondLst>
                                   <p:childTnLst>
                                     <p:set>
                                       <p:cBhvr>
-                                        <p:cTn id="26" dur="1" fill="hold">
+                                        <p:cTn id="25" dur="1" fill="hold">
                                           <p:stCondLst>
                                             <p:cond delay="0"/>
                                           </p:stCondLst>
@@ -13303,18 +13214,6 @@
                                         <p:strVal val="visible"/>
                                       </p:to>
                                     </p:set>
-                                    <p:animEffect transition="in" filter="fade">
-                                      <p:cBhvr>
-                                        <p:cTn id="27" dur="500"/>
-                                        <p:tgtEl>
-                                          <p:spTgt spid="4">
-                                            <p:txEl>
-                                              <p:pRg st="3" end="3"/>
-                                            </p:txEl>
-                                          </p:spTgt>
-                                        </p:tgtEl>
-                                      </p:cBhvr>
-                                    </p:animEffect>
                                   </p:childTnLst>
                                 </p:cTn>
                               </p:par>
@@ -13346,7 +13245,7 @@
       </p:par>
     </p:tnLst>
     <p:bldLst>
-      <p:bldP spid="4" grpId="0" build="p"/>
+      <p:bldP spid="4" grpId="0" uiExpand="1" build="p" animBg="1"/>
     </p:bldLst>
   </p:timing>
 </p:sld>
@@ -15170,13 +15069,8 @@
             <a:pPr lvl="1"/>
             <a:r>
               <a:rPr lang="fr-FR" dirty="0" smtClean="0"/>
-              <a:t>Pour </a:t>
-            </a:r>
-            <a:r>
-              <a:rPr lang="fr-FR" dirty="0" smtClean="0"/>
-              <a:t>un investissement max de 500, pour 2000 actions, le temps d’exécutions passe à 0.43783068656921387 s (soit 1,59x plus)</a:t>
-            </a:r>
-            <a:endParaRPr lang="fr-FR" dirty="0" smtClean="0"/>
+              <a:t>Pour un investissement max de 500, pour 2000 actions, le temps d’exécutions passe à 0.43783068656921387 s (soit 1,59x plus)</a:t>
+            </a:r>
           </a:p>
           <a:p>
             <a:pPr lvl="1"/>

</xml_diff>